<commit_message>
Link added to presentation
</commit_message>
<xml_diff>
--- a/Drive Safe.pptx
+++ b/Drive Safe.pptx
@@ -8543,11 +8543,43 @@
             </a:r>
             <a:r>
               <a:rPr lang="en-GB" sz="2800" dirty="0"/>
-              <a:t> alerts based on weather and location to the driver.</a:t>
-            </a:r>
-          </a:p>
-          <a:p>
+              <a:t> alerts based on weather and location to the </a:t>
+            </a:r>
+            <a:r>
+              <a:rPr lang="en-GB" sz="2800"/>
+              <a:t>driver</a:t>
+            </a:r>
+            <a:r>
+              <a:rPr lang="en-GB" sz="2800" smtClean="0"/>
+              <a:t>.</a:t>
+            </a:r>
             <a:endParaRPr lang="en-GB" sz="2800" dirty="0"/>
+          </a:p>
+          <a:p>
+            <a:r>
+              <a:rPr lang="en-GB" sz="2800" dirty="0" smtClean="0"/>
+              <a:t>Link for </a:t>
+            </a:r>
+            <a:r>
+              <a:rPr lang="en-GB" sz="2800" dirty="0"/>
+              <a:t>web application:</a:t>
+            </a:r>
+            <a:br>
+              <a:rPr lang="en-GB" sz="2800" dirty="0"/>
+            </a:br>
+            <a:r>
+              <a:rPr lang="en-GB" sz="2800" dirty="0">
+                <a:hlinkClick r:id="rId2"/>
+              </a:rPr>
+              <a:t>http://speedsafetyphp.azurewebsites.net</a:t>
+            </a:r>
+            <a:r>
+              <a:rPr lang="en-GB" sz="2800" dirty="0" smtClean="0">
+                <a:hlinkClick r:id="rId2"/>
+              </a:rPr>
+              <a:t>/</a:t>
+            </a:r>
+            <a:endParaRPr lang="en-GB" sz="2800" dirty="0" smtClean="0"/>
           </a:p>
           <a:p>
             <a:endParaRPr lang="en-GB" sz="2800" dirty="0"/>

</xml_diff>